<commit_message>
add new vector generator 4c1d
</commit_message>
<xml_diff>
--- a/doc/特徴ベクトル生成コードの開発.pptx
+++ b/doc/特徴ベクトル生成コードの開発.pptx
@@ -107,6 +107,22 @@
       </a:defRPr>
     </a:lvl9pPr>
   </p:defaultTextStyle>
+  <p:extLst>
+    <p:ext uri="{EFAFB233-063F-42B5-8137-9DF3F51BA10A}">
+      <p15:sldGuideLst xmlns:p15="http://schemas.microsoft.com/office/powerpoint/2012/main">
+        <p15:guide id="1" orient="horz" pos="2160">
+          <p15:clr>
+            <a:srgbClr val="A4A3A4"/>
+          </p15:clr>
+        </p15:guide>
+        <p15:guide id="2" pos="2880">
+          <p15:clr>
+            <a:srgbClr val="A4A3A4"/>
+          </p15:clr>
+        </p15:guide>
+      </p15:sldGuideLst>
+    </p:ext>
+  </p:extLst>
 </p:presentation>
 </file>
 
@@ -1922,7 +1938,7 @@
           <a:p>
             <a:fld id="{E90ED720-0104-4369-84BC-D37694168613}" type="datetimeFigureOut">
               <a:rPr kumimoji="1" lang="ja-JP" altLang="en-US" smtClean="0"/>
-              <a:t>2013/3/29</a:t>
+              <a:t>2016/7/20</a:t>
             </a:fld>
             <a:endParaRPr kumimoji="1" lang="ja-JP" altLang="en-US"/>
           </a:p>
@@ -2135,7 +2151,7 @@
           <a:p>
             <a:fld id="{E90ED720-0104-4369-84BC-D37694168613}" type="datetimeFigureOut">
               <a:rPr kumimoji="1" lang="ja-JP" altLang="en-US" smtClean="0"/>
-              <a:t>2013/3/29</a:t>
+              <a:t>2016/7/20</a:t>
             </a:fld>
             <a:endParaRPr kumimoji="1" lang="ja-JP" altLang="en-US"/>
           </a:p>
@@ -2286,7 +2302,7 @@
           <a:p>
             <a:fld id="{E90ED720-0104-4369-84BC-D37694168613}" type="datetimeFigureOut">
               <a:rPr kumimoji="1" lang="ja-JP" altLang="en-US" smtClean="0"/>
-              <a:t>2013/3/29</a:t>
+              <a:t>2016/7/20</a:t>
             </a:fld>
             <a:endParaRPr kumimoji="1" lang="ja-JP" altLang="en-US"/>
           </a:p>
@@ -4176,7 +4192,7 @@
           <a:p>
             <a:fld id="{E90ED720-0104-4369-84BC-D37694168613}" type="datetimeFigureOut">
               <a:rPr kumimoji="1" lang="ja-JP" altLang="en-US" smtClean="0"/>
-              <a:t>2013/3/29</a:t>
+              <a:t>2016/7/20</a:t>
             </a:fld>
             <a:endParaRPr kumimoji="1" lang="ja-JP" altLang="en-US"/>
           </a:p>
@@ -6046,7 +6062,7 @@
           <a:p>
             <a:fld id="{E90ED720-0104-4369-84BC-D37694168613}" type="datetimeFigureOut">
               <a:rPr kumimoji="1" lang="ja-JP" altLang="en-US" smtClean="0"/>
-              <a:t>2013/3/29</a:t>
+              <a:t>2016/7/20</a:t>
             </a:fld>
             <a:endParaRPr kumimoji="1" lang="ja-JP" altLang="en-US"/>
           </a:p>
@@ -6159,7 +6175,7 @@
           <a:p>
             <a:fld id="{E90ED720-0104-4369-84BC-D37694168613}" type="datetimeFigureOut">
               <a:rPr kumimoji="1" lang="ja-JP" altLang="en-US" smtClean="0"/>
-              <a:t>2013/3/29</a:t>
+              <a:t>2016/7/20</a:t>
             </a:fld>
             <a:endParaRPr kumimoji="1" lang="ja-JP" altLang="en-US"/>
           </a:p>
@@ -6828,7 +6844,7 @@
           <a:p>
             <a:fld id="{E90ED720-0104-4369-84BC-D37694168613}" type="datetimeFigureOut">
               <a:rPr kumimoji="1" lang="ja-JP" altLang="en-US" smtClean="0"/>
-              <a:t>2013/3/29</a:t>
+              <a:t>2016/7/20</a:t>
             </a:fld>
             <a:endParaRPr kumimoji="1" lang="ja-JP" altLang="en-US"/>
           </a:p>
@@ -6941,7 +6957,7 @@
           <a:p>
             <a:fld id="{E90ED720-0104-4369-84BC-D37694168613}" type="datetimeFigureOut">
               <a:rPr kumimoji="1" lang="ja-JP" altLang="en-US" smtClean="0"/>
-              <a:t>2013/3/29</a:t>
+              <a:t>2016/7/20</a:t>
             </a:fld>
             <a:endParaRPr kumimoji="1" lang="ja-JP" altLang="en-US"/>
           </a:p>
@@ -8652,7 +8668,7 @@
           <a:p>
             <a:fld id="{E90ED720-0104-4369-84BC-D37694168613}" type="datetimeFigureOut">
               <a:rPr kumimoji="1" lang="ja-JP" altLang="en-US" smtClean="0"/>
-              <a:t>2013/3/29</a:t>
+              <a:t>2016/7/20</a:t>
             </a:fld>
             <a:endParaRPr kumimoji="1" lang="ja-JP" altLang="en-US"/>
           </a:p>
@@ -8803,7 +8819,7 @@
           <a:p>
             <a:fld id="{E90ED720-0104-4369-84BC-D37694168613}" type="datetimeFigureOut">
               <a:rPr kumimoji="1" lang="ja-JP" altLang="en-US" smtClean="0"/>
-              <a:t>2013/3/29</a:t>
+              <a:t>2016/7/20</a:t>
             </a:fld>
             <a:endParaRPr kumimoji="1" lang="ja-JP" altLang="en-US"/>
           </a:p>
@@ -12450,7 +12466,7 @@
           <a:p>
             <a:fld id="{E90ED720-0104-4369-84BC-D37694168613}" type="datetimeFigureOut">
               <a:rPr kumimoji="1" lang="ja-JP" altLang="en-US" smtClean="0"/>
-              <a:t>2013/3/29</a:t>
+              <a:t>2016/7/20</a:t>
             </a:fld>
             <a:endParaRPr kumimoji="1" lang="ja-JP" altLang="en-US"/>
           </a:p>
@@ -14309,7 +14325,7 @@
           <a:p>
             <a:fld id="{E90ED720-0104-4369-84BC-D37694168613}" type="datetimeFigureOut">
               <a:rPr kumimoji="1" lang="ja-JP" altLang="en-US" smtClean="0"/>
-              <a:t>2013/3/29</a:t>
+              <a:t>2016/7/20</a:t>
             </a:fld>
             <a:endParaRPr kumimoji="1" lang="ja-JP" altLang="en-US"/>
           </a:p>
@@ -14904,13 +14920,8 @@
           <a:p>
             <a:r>
               <a:rPr kumimoji="1" lang="en-US" altLang="ja-JP" dirty="0" smtClean="0"/>
-              <a:t>Update: </a:t>
-            </a:r>
-            <a:r>
-              <a:rPr kumimoji="1" lang="en-US" altLang="ja-JP" dirty="0" smtClean="0"/>
-              <a:t>2013/3/29</a:t>
-            </a:r>
-            <a:endParaRPr kumimoji="1" lang="en-US" altLang="ja-JP" dirty="0" smtClean="0"/>
+              <a:t>Update: 2013/3/29</a:t>
+            </a:r>
           </a:p>
           <a:p>
             <a:r>
@@ -15165,11 +15176,7 @@
           <a:p>
             <a:r>
               <a:rPr lang="ja-JP" altLang="en-US" dirty="0" smtClean="0"/>
-              <a:t>作成する</a:t>
-            </a:r>
-            <a:r>
-              <a:rPr lang="ja-JP" altLang="en-US" dirty="0" smtClean="0"/>
-              <a:t>のは基本的には</a:t>
+              <a:t>作成するのは基本的には</a:t>
             </a:r>
             <a:r>
               <a:rPr lang="en-US" altLang="ja-JP" dirty="0" smtClean="0"/>
@@ -15792,6 +15799,90 @@
               <a:t>ここに新規設計したクラス名を入力する</a:t>
             </a:r>
             <a:endParaRPr kumimoji="1" lang="ja-JP" altLang="en-US" dirty="0"/>
+          </a:p>
+        </p:txBody>
+      </p:sp>
+      <p:sp>
+        <p:nvSpPr>
+          <p:cNvPr id="10" name="四角形吹き出し 9"/>
+          <p:cNvSpPr/>
+          <p:nvPr/>
+        </p:nvSpPr>
+        <p:spPr>
+          <a:xfrm>
+            <a:off x="270372" y="5891762"/>
+            <a:ext cx="3826768" cy="688215"/>
+          </a:xfrm>
+          <a:prstGeom prst="wedgeRectCallout">
+            <a:avLst>
+              <a:gd name="adj1" fmla="val -18995"/>
+              <a:gd name="adj2" fmla="val -90806"/>
+            </a:avLst>
+          </a:prstGeom>
+          <a:solidFill>
+            <a:schemeClr val="bg1"/>
+          </a:solidFill>
+        </p:spPr>
+        <p:style>
+          <a:lnRef idx="2">
+            <a:schemeClr val="accent1">
+              <a:shade val="50000"/>
+            </a:schemeClr>
+          </a:lnRef>
+          <a:fillRef idx="1">
+            <a:schemeClr val="accent1"/>
+          </a:fillRef>
+          <a:effectRef idx="0">
+            <a:schemeClr val="accent1"/>
+          </a:effectRef>
+          <a:fontRef idx="minor">
+            <a:schemeClr val="lt1"/>
+          </a:fontRef>
+        </p:style>
+        <p:txBody>
+          <a:bodyPr rtlCol="0" anchor="ctr"/>
+          <a:lstStyle/>
+          <a:p>
+            <a:r>
+              <a:rPr lang="en-US" altLang="ja-JP" dirty="0" err="1" smtClean="0">
+                <a:solidFill>
+                  <a:srgbClr val="000000"/>
+                </a:solidFill>
+                <a:highlight>
+                  <a:srgbClr val="FFFFFF"/>
+                </a:highlight>
+                <a:latin typeface="ＭＳ ゴシック" panose="020B0609070205080204" pitchFamily="49" charset="-128"/>
+                <a:ea typeface="ＭＳ ゴシック" panose="020B0609070205080204" pitchFamily="49" charset="-128"/>
+              </a:rPr>
+              <a:t>SetGenerator</a:t>
+            </a:r>
+            <a:r>
+              <a:rPr lang="en-US" altLang="ja-JP" dirty="0" smtClean="0">
+                <a:solidFill>
+                  <a:srgbClr val="000000"/>
+                </a:solidFill>
+                <a:highlight>
+                  <a:srgbClr val="FFFFFF"/>
+                </a:highlight>
+                <a:latin typeface="ＭＳ ゴシック" panose="020B0609070205080204" pitchFamily="49" charset="-128"/>
+                <a:ea typeface="ＭＳ ゴシック" panose="020B0609070205080204" pitchFamily="49" charset="-128"/>
+              </a:rPr>
+              <a:t>()</a:t>
+            </a:r>
+            <a:r>
+              <a:rPr lang="ja-JP" altLang="en-US" dirty="0" smtClean="0">
+                <a:solidFill>
+                  <a:srgbClr val="000000"/>
+                </a:solidFill>
+                <a:highlight>
+                  <a:srgbClr val="FFFFFF"/>
+                </a:highlight>
+                <a:latin typeface="ＭＳ ゴシック" panose="020B0609070205080204" pitchFamily="49" charset="-128"/>
+                <a:ea typeface="ＭＳ ゴシック" panose="020B0609070205080204" pitchFamily="49" charset="-128"/>
+              </a:rPr>
+              <a:t>メソッドも忘れずに編集！</a:t>
+            </a:r>
+            <a:endParaRPr lang="ja-JP" altLang="en-US" dirty="0"/>
           </a:p>
         </p:txBody>
       </p:sp>

</xml_diff>